<commit_message>
made a basic script for our presenting, added speaker notes to presentation
</commit_message>
<xml_diff>
--- a/FinalProjectPresentation.pptx
+++ b/FinalProjectPresentation.pptx
@@ -530,110 +530,313 @@
           <a:bodyPr/>
           <a:lstStyle/>
           <a:p>
-            <a:r>
-              <a:rPr lang="en-US" dirty="0" smtClean="0"/>
-              <a:t>Our project focuses on the dataset created from Bowdoin's collection of Kate </a:t>
-            </a:r>
-            <a:r>
-              <a:rPr lang="en-US" dirty="0" err="1" smtClean="0"/>
+            <a:pPr marL="342900" marR="0" lvl="0" indent="-342900">
+              <a:spcBef>
+                <a:spcPts val="0"/>
+              </a:spcBef>
+              <a:spcAft>
+                <a:spcPts val="0"/>
+              </a:spcAft>
+              <a:buFont typeface="Symbol" charset="2"/>
+              <a:buChar char=""/>
+            </a:pPr>
+            <a:r>
+              <a:rPr lang="en-US" sz="1200" dirty="0" smtClean="0">
+                <a:effectLst/>
+                <a:latin typeface="Calibri" charset="0"/>
+                <a:ea typeface="Calibri" charset="0"/>
+                <a:cs typeface="Times New Roman" charset="0"/>
+              </a:rPr>
+              <a:t>Our dataset was created based on information regarding Bowdoin's collection of Kate </a:t>
+            </a:r>
+            <a:r>
+              <a:rPr lang="en-US" sz="1200" dirty="0" err="1" smtClean="0">
+                <a:effectLst/>
+                <a:latin typeface="Calibri" charset="0"/>
+                <a:ea typeface="Calibri" charset="0"/>
+                <a:cs typeface="Times New Roman" charset="0"/>
+              </a:rPr>
               <a:t>Furbish's</a:t>
             </a:r>
             <a:r>
-              <a:rPr lang="en-US" dirty="0" smtClean="0"/>
-              <a:t> </a:t>
-            </a:r>
-            <a:r>
-              <a:rPr lang="en-US" dirty="0" err="1" smtClean="0"/>
-              <a:t>botanitcal</a:t>
-            </a:r>
-            <a:r>
-              <a:rPr lang="en-US" dirty="0" smtClean="0"/>
-              <a:t> drawings</a:t>
-            </a:r>
-          </a:p>
-          <a:p>
-            <a:r>
-              <a:rPr lang="en-US" dirty="0" smtClean="0"/>
-              <a:t>Kate Furbish was a botanist from Brunswick, Maine.</a:t>
-            </a:r>
-            <a:endParaRPr lang="en-US" baseline="30000" dirty="0" smtClean="0"/>
-          </a:p>
-          <a:p>
-            <a:r>
-              <a:rPr lang="en-US" dirty="0" smtClean="0"/>
+              <a:rPr lang="en-US" sz="1200" dirty="0" smtClean="0">
+                <a:effectLst/>
+                <a:latin typeface="Calibri" charset="0"/>
+                <a:ea typeface="Calibri" charset="0"/>
+                <a:cs typeface="Times New Roman" charset="0"/>
+              </a:rPr>
+              <a:t> botanical drawings</a:t>
+            </a:r>
+          </a:p>
+          <a:p>
+            <a:pPr marL="342900" marR="0" lvl="0" indent="-342900">
+              <a:spcBef>
+                <a:spcPts val="0"/>
+              </a:spcBef>
+              <a:spcAft>
+                <a:spcPts val="0"/>
+              </a:spcAft>
+              <a:buFont typeface="Symbol" charset="2"/>
+              <a:buChar char=""/>
+            </a:pPr>
+            <a:r>
+              <a:rPr lang="en-US" sz="1200" dirty="0" smtClean="0">
+                <a:effectLst/>
+                <a:latin typeface="Calibri" charset="0"/>
+                <a:ea typeface="Calibri" charset="0"/>
+                <a:cs typeface="Times New Roman" charset="0"/>
+              </a:rPr>
+              <a:t>Who was Kate Furbish?</a:t>
+            </a:r>
+          </a:p>
+          <a:p>
+            <a:pPr marL="742950" marR="0" lvl="1" indent="-285750">
+              <a:spcBef>
+                <a:spcPts val="0"/>
+              </a:spcBef>
+              <a:spcAft>
+                <a:spcPts val="0"/>
+              </a:spcAft>
+              <a:buFont typeface="Courier New" charset="0"/>
+              <a:buChar char="o"/>
+            </a:pPr>
+            <a:r>
+              <a:rPr lang="en-US" sz="1200" dirty="0" smtClean="0">
+                <a:effectLst/>
+                <a:latin typeface="Calibri" charset="0"/>
+                <a:ea typeface="Calibri" charset="0"/>
+                <a:cs typeface="Times New Roman" charset="0"/>
+              </a:rPr>
+              <a:t>Kate Furbish was an extremely prolific botanist from Brunswick, Maine.</a:t>
+            </a:r>
+          </a:p>
+          <a:p>
+            <a:pPr marL="742950" marR="0" lvl="1" indent="-285750">
+              <a:spcBef>
+                <a:spcPts val="0"/>
+              </a:spcBef>
+              <a:spcAft>
+                <a:spcPts val="0"/>
+              </a:spcAft>
+              <a:buFont typeface="Courier New" charset="0"/>
+              <a:buChar char="o"/>
+            </a:pPr>
+            <a:r>
+              <a:rPr lang="en-US" sz="1200" dirty="0" smtClean="0">
+                <a:effectLst/>
+                <a:latin typeface="Calibri" charset="0"/>
+                <a:ea typeface="Calibri" charset="0"/>
+                <a:cs typeface="Times New Roman" charset="0"/>
+              </a:rPr>
               <a:t>She lived from 1834 to 1931, where she traveled around Maine collecting samples and cataloging hundreds of the flora in Maine.</a:t>
             </a:r>
-            <a:endParaRPr lang="en-US" baseline="30000" dirty="0" smtClean="0"/>
-          </a:p>
-          <a:p>
-            <a:r>
-              <a:rPr lang="en-US" dirty="0" smtClean="0"/>
+          </a:p>
+          <a:p>
+            <a:pPr marL="742950" marR="0" lvl="1" indent="-285750">
+              <a:spcBef>
+                <a:spcPts val="0"/>
+              </a:spcBef>
+              <a:spcAft>
+                <a:spcPts val="0"/>
+              </a:spcAft>
+              <a:buFont typeface="Courier New" charset="0"/>
+              <a:buChar char="o"/>
+            </a:pPr>
+            <a:r>
+              <a:rPr lang="en-US" sz="1200" dirty="0" smtClean="0">
+                <a:effectLst/>
+                <a:latin typeface="Calibri" charset="0"/>
+                <a:ea typeface="Calibri" charset="0"/>
+                <a:cs typeface="Times New Roman" charset="0"/>
+              </a:rPr>
               <a:t>Her </a:t>
             </a:r>
             <a:r>
-              <a:rPr lang="en-US" dirty="0" err="1" smtClean="0"/>
+              <a:rPr lang="en-US" sz="1200" dirty="0" err="1" smtClean="0">
+                <a:effectLst/>
+                <a:latin typeface="Calibri" charset="0"/>
+                <a:ea typeface="Calibri" charset="0"/>
+                <a:cs typeface="Times New Roman" charset="0"/>
+              </a:rPr>
               <a:t>dilligent</a:t>
             </a:r>
             <a:r>
-              <a:rPr lang="en-US" dirty="0" smtClean="0"/>
+              <a:rPr lang="en-US" sz="1200" dirty="0" smtClean="0">
+                <a:effectLst/>
+                <a:latin typeface="Calibri" charset="0"/>
+                <a:ea typeface="Calibri" charset="0"/>
+                <a:cs typeface="Times New Roman" charset="0"/>
+              </a:rPr>
               <a:t>, prolific cataloging of the flora of Maine while defying gender norms of her time marks Furbish as one of the unsung </a:t>
             </a:r>
             <a:r>
-              <a:rPr lang="en-US" dirty="0" err="1" smtClean="0"/>
+              <a:rPr lang="en-US" sz="1200" dirty="0" err="1" smtClean="0">
+                <a:effectLst/>
+                <a:latin typeface="Calibri" charset="0"/>
+                <a:ea typeface="Calibri" charset="0"/>
+                <a:cs typeface="Times New Roman" charset="0"/>
+              </a:rPr>
               <a:t>heros</a:t>
             </a:r>
             <a:r>
-              <a:rPr lang="en-US" dirty="0" smtClean="0"/>
+              <a:rPr lang="en-US" sz="1200" dirty="0" smtClean="0">
+                <a:effectLst/>
+                <a:latin typeface="Calibri" charset="0"/>
+                <a:ea typeface="Calibri" charset="0"/>
+                <a:cs typeface="Times New Roman" charset="0"/>
+              </a:rPr>
               <a:t> of botany. </a:t>
             </a:r>
           </a:p>
           <a:p>
-            <a:r>
-              <a:rPr lang="en-US" dirty="0" smtClean="0"/>
+            <a:pPr marL="742950" marR="0" lvl="1" indent="-285750">
+              <a:spcBef>
+                <a:spcPts val="0"/>
+              </a:spcBef>
+              <a:spcAft>
+                <a:spcPts val="0"/>
+              </a:spcAft>
+              <a:buFont typeface="Courier New" charset="0"/>
+              <a:buChar char="o"/>
+            </a:pPr>
+            <a:r>
+              <a:rPr lang="en-US" sz="1200" dirty="0" smtClean="0">
+                <a:effectLst/>
+                <a:latin typeface="Calibri" charset="0"/>
+                <a:ea typeface="Calibri" charset="0"/>
+                <a:cs typeface="Times New Roman" charset="0"/>
+              </a:rPr>
               <a:t>Her work is now largely curated at Bowdoin College, and can be seen on </a:t>
             </a:r>
             <a:r>
-              <a:rPr lang="en-US" dirty="0" err="1" smtClean="0"/>
+              <a:rPr lang="en-US" sz="1200" dirty="0" err="1" smtClean="0">
+                <a:effectLst/>
+                <a:latin typeface="Calibri" charset="0"/>
+                <a:ea typeface="Calibri" charset="0"/>
+                <a:cs typeface="Times New Roman" charset="0"/>
+              </a:rPr>
               <a:t>dipslay</a:t>
             </a:r>
             <a:r>
-              <a:rPr lang="en-US" dirty="0" smtClean="0"/>
-              <a:t> in Hawthorne-Longfellow Library. Our project uses a dataset that holds information on each sample in her catalogues, such as: </a:t>
-            </a:r>
-          </a:p>
-          <a:p>
-            <a:pPr lvl="1"/>
-            <a:r>
-              <a:rPr lang="en-US" dirty="0" smtClean="0"/>
+              <a:rPr lang="en-US" sz="1200" dirty="0" smtClean="0">
+                <a:effectLst/>
+                <a:latin typeface="Calibri" charset="0"/>
+                <a:ea typeface="Calibri" charset="0"/>
+                <a:cs typeface="Times New Roman" charset="0"/>
+              </a:rPr>
+              <a:t> in Hawthorne-Longfellow Library.</a:t>
+            </a:r>
+          </a:p>
+          <a:p>
+            <a:pPr marL="342900" marR="0" lvl="0" indent="-342900">
+              <a:spcBef>
+                <a:spcPts val="0"/>
+              </a:spcBef>
+              <a:spcAft>
+                <a:spcPts val="0"/>
+              </a:spcAft>
+              <a:buFont typeface="Symbol" charset="2"/>
+              <a:buChar char=""/>
+            </a:pPr>
+            <a:r>
+              <a:rPr lang="en-US" sz="1200" dirty="0" smtClean="0">
+                <a:effectLst/>
+                <a:latin typeface="Calibri" charset="0"/>
+                <a:ea typeface="Calibri" charset="0"/>
+                <a:cs typeface="Times New Roman" charset="0"/>
+              </a:rPr>
+              <a:t>Our project uses a dataset that holds information on each sample in her catalogues, such as: </a:t>
+            </a:r>
+          </a:p>
+          <a:p>
+            <a:pPr marL="742950" marR="0" lvl="1" indent="-285750">
+              <a:spcBef>
+                <a:spcPts val="0"/>
+              </a:spcBef>
+              <a:spcAft>
+                <a:spcPts val="0"/>
+              </a:spcAft>
+              <a:buFont typeface="Courier New" charset="0"/>
+              <a:buChar char="o"/>
+            </a:pPr>
+            <a:r>
+              <a:rPr lang="en-US" sz="1200" dirty="0" smtClean="0">
+                <a:effectLst/>
+                <a:latin typeface="Calibri" charset="0"/>
+                <a:ea typeface="Calibri" charset="0"/>
+                <a:cs typeface="Times New Roman" charset="0"/>
+              </a:rPr>
               <a:t>Location of where the sample was found</a:t>
             </a:r>
           </a:p>
           <a:p>
-            <a:pPr lvl="1"/>
-            <a:r>
-              <a:rPr lang="en-US" dirty="0" smtClean="0"/>
+            <a:pPr marL="742950" marR="0" lvl="1" indent="-285750">
+              <a:spcBef>
+                <a:spcPts val="0"/>
+              </a:spcBef>
+              <a:spcAft>
+                <a:spcPts val="0"/>
+              </a:spcAft>
+              <a:buFont typeface="Courier New" charset="0"/>
+              <a:buChar char="o"/>
+            </a:pPr>
+            <a:r>
+              <a:rPr lang="en-US" sz="1200" dirty="0" smtClean="0">
+                <a:effectLst/>
+                <a:latin typeface="Calibri" charset="0"/>
+                <a:ea typeface="Calibri" charset="0"/>
+                <a:cs typeface="Times New Roman" charset="0"/>
+              </a:rPr>
               <a:t>Year that the sample was found</a:t>
             </a:r>
           </a:p>
           <a:p>
-            <a:pPr lvl="1"/>
-            <a:r>
-              <a:rPr lang="en-US" dirty="0" smtClean="0"/>
+            <a:pPr marL="742950" marR="0" lvl="1" indent="-285750">
+              <a:spcBef>
+                <a:spcPts val="0"/>
+              </a:spcBef>
+              <a:spcAft>
+                <a:spcPts val="0"/>
+              </a:spcAft>
+              <a:buFont typeface="Courier New" charset="0"/>
+              <a:buChar char="o"/>
+            </a:pPr>
+            <a:r>
+              <a:rPr lang="en-US" sz="1200" dirty="0" smtClean="0">
+                <a:effectLst/>
+                <a:latin typeface="Calibri" charset="0"/>
+                <a:ea typeface="Calibri" charset="0"/>
+                <a:cs typeface="Times New Roman" charset="0"/>
+              </a:rPr>
               <a:t>Common and scientific labels (current and at time of discovery)</a:t>
             </a:r>
           </a:p>
           <a:p>
-            <a:pPr lvl="1"/>
-            <a:r>
-              <a:rPr lang="en-US" dirty="0" smtClean="0"/>
+            <a:pPr marL="742950" marR="0" lvl="1" indent="-285750">
+              <a:spcBef>
+                <a:spcPts val="0"/>
+              </a:spcBef>
+              <a:spcAft>
+                <a:spcPts val="0"/>
+              </a:spcAft>
+              <a:buFont typeface="Courier New" charset="0"/>
+              <a:buChar char="o"/>
+            </a:pPr>
+            <a:r>
+              <a:rPr lang="en-US" sz="1200" dirty="0" smtClean="0">
+                <a:effectLst/>
+                <a:latin typeface="Calibri" charset="0"/>
+                <a:ea typeface="Calibri" charset="0"/>
+                <a:cs typeface="Times New Roman" charset="0"/>
+              </a:rPr>
               <a:t>Where in her books each flora sample can be found</a:t>
             </a:r>
-          </a:p>
-          <a:p>
-            <a:endParaRPr lang="en-US" dirty="0" smtClean="0"/>
-          </a:p>
-          <a:p>
-            <a:endParaRPr lang="en-US" dirty="0"/>
+            <a:endParaRPr lang="en-US" sz="1200" dirty="0">
+              <a:effectLst/>
+              <a:latin typeface="Calibri" charset="0"/>
+              <a:ea typeface="Calibri" charset="0"/>
+              <a:cs typeface="Times New Roman" charset="0"/>
+            </a:endParaRPr>
           </a:p>
         </p:txBody>
       </p:sp>
@@ -717,7 +920,73 @@
           <a:bodyPr/>
           <a:lstStyle/>
           <a:p>
-            <a:endParaRPr lang="en-US" dirty="0"/>
+            <a:pPr marL="342900" marR="0" lvl="0" indent="-342900">
+              <a:spcBef>
+                <a:spcPts val="0"/>
+              </a:spcBef>
+              <a:spcAft>
+                <a:spcPts val="0"/>
+              </a:spcAft>
+              <a:buFont typeface="Symbol" charset="2"/>
+              <a:buChar char=""/>
+            </a:pPr>
+            <a:r>
+              <a:rPr lang="en-US" sz="1200" dirty="0" smtClean="0">
+                <a:effectLst/>
+                <a:latin typeface="Calibri" charset="0"/>
+                <a:ea typeface="Calibri" charset="0"/>
+                <a:cs typeface="Times New Roman" charset="0"/>
+              </a:rPr>
+              <a:t>This is an example of what a line in our dataset would look like</a:t>
+            </a:r>
+          </a:p>
+          <a:p>
+            <a:pPr marL="342900" marR="0" lvl="0" indent="-342900">
+              <a:spcBef>
+                <a:spcPts val="0"/>
+              </a:spcBef>
+              <a:spcAft>
+                <a:spcPts val="0"/>
+              </a:spcAft>
+              <a:buFont typeface="Symbol" charset="2"/>
+              <a:buChar char=""/>
+            </a:pPr>
+            <a:r>
+              <a:rPr lang="en-US" sz="1200" dirty="0" smtClean="0">
+                <a:effectLst/>
+                <a:latin typeface="Calibri" charset="0"/>
+                <a:ea typeface="Calibri" charset="0"/>
+                <a:cs typeface="Times New Roman" charset="0"/>
+              </a:rPr>
+              <a:t>Our dataset was given to us with some, though not significant, amount of formatting necessary, as some lines would hold multiple samples and there was some inconsistency in formatting (such as hidden characters in town names)</a:t>
+            </a:r>
+          </a:p>
+          <a:p>
+            <a:pPr marL="342900" marR="0" lvl="0" indent="-342900">
+              <a:spcBef>
+                <a:spcPts val="0"/>
+              </a:spcBef>
+              <a:spcAft>
+                <a:spcPts val="0"/>
+              </a:spcAft>
+              <a:buFont typeface="Symbol" charset="2"/>
+              <a:buChar char=""/>
+            </a:pPr>
+            <a:r>
+              <a:rPr lang="en-US" sz="1200" dirty="0" smtClean="0">
+                <a:effectLst/>
+                <a:latin typeface="Calibri" charset="0"/>
+                <a:ea typeface="Calibri" charset="0"/>
+                <a:cs typeface="Times New Roman" charset="0"/>
+              </a:rPr>
+              <a:t>As you can see, there is a guide to where in the collection the flora is represented, along with the various scientific names the flora has held over time, its current common name, the size of the drawing in the collection, and the year and location the sample was taken</a:t>
+            </a:r>
+            <a:endParaRPr lang="en-US" sz="1200" dirty="0">
+              <a:effectLst/>
+              <a:latin typeface="Calibri" charset="0"/>
+              <a:ea typeface="Calibri" charset="0"/>
+              <a:cs typeface="Times New Roman" charset="0"/>
+            </a:endParaRPr>
           </a:p>
         </p:txBody>
       </p:sp>
@@ -801,7 +1070,178 @@
           <a:bodyPr/>
           <a:lstStyle/>
           <a:p>
-            <a:endParaRPr lang="en-US" dirty="0"/>
+            <a:pPr marL="342900" marR="0" lvl="0" indent="-342900">
+              <a:spcBef>
+                <a:spcPts val="0"/>
+              </a:spcBef>
+              <a:spcAft>
+                <a:spcPts val="0"/>
+              </a:spcAft>
+              <a:buFont typeface="Symbol" charset="2"/>
+              <a:buChar char=""/>
+            </a:pPr>
+            <a:r>
+              <a:rPr lang="en-US" sz="1200" dirty="0" smtClean="0">
+                <a:effectLst/>
+                <a:latin typeface="Calibri" charset="0"/>
+                <a:ea typeface="Calibri" charset="0"/>
+                <a:cs typeface="Times New Roman" charset="0"/>
+              </a:rPr>
+              <a:t>These were the primary questions we set out to answer, which we will discuss the success of later on in our presentation</a:t>
+            </a:r>
+          </a:p>
+          <a:p>
+            <a:pPr marL="342900" marR="0" lvl="0" indent="-342900">
+              <a:spcBef>
+                <a:spcPts val="0"/>
+              </a:spcBef>
+              <a:spcAft>
+                <a:spcPts val="0"/>
+              </a:spcAft>
+              <a:buFont typeface="Symbol" charset="2"/>
+              <a:buChar char=""/>
+            </a:pPr>
+            <a:r>
+              <a:rPr lang="en-US" sz="1200" dirty="0" smtClean="0">
+                <a:effectLst/>
+                <a:latin typeface="Calibri" charset="0"/>
+                <a:ea typeface="Calibri" charset="0"/>
+                <a:cs typeface="Times New Roman" charset="0"/>
+              </a:rPr>
+              <a:t>They are:</a:t>
+            </a:r>
+          </a:p>
+          <a:p>
+            <a:pPr marL="742950" marR="0" lvl="1" indent="-285750">
+              <a:spcBef>
+                <a:spcPts val="0"/>
+              </a:spcBef>
+              <a:spcAft>
+                <a:spcPts val="0"/>
+              </a:spcAft>
+              <a:buFont typeface="Courier New" charset="0"/>
+              <a:buChar char="o"/>
+            </a:pPr>
+            <a:r>
+              <a:rPr lang="en-US" sz="1200" dirty="0" smtClean="0">
+                <a:effectLst/>
+                <a:latin typeface="Calibri" charset="0"/>
+                <a:ea typeface="Calibri" charset="0"/>
+                <a:cs typeface="Times New Roman" charset="0"/>
+              </a:rPr>
+              <a:t>Determining where Kate Furbish went and when</a:t>
+            </a:r>
+          </a:p>
+          <a:p>
+            <a:pPr marL="1143000" marR="0" lvl="2" indent="-228600">
+              <a:spcBef>
+                <a:spcPts val="0"/>
+              </a:spcBef>
+              <a:spcAft>
+                <a:spcPts val="0"/>
+              </a:spcAft>
+              <a:buFont typeface="Wingdings" charset="2"/>
+              <a:buChar char=""/>
+            </a:pPr>
+            <a:r>
+              <a:rPr lang="en-US" sz="1200" dirty="0" smtClean="0">
+                <a:effectLst/>
+                <a:latin typeface="Calibri" charset="0"/>
+                <a:ea typeface="Calibri" charset="0"/>
+                <a:cs typeface="Times New Roman" charset="0"/>
+              </a:rPr>
+              <a:t>We discovered early on this would be limited by the fact that she mainly recorded the year in which she took a sample, so we could not determine her general travel pattern</a:t>
+            </a:r>
+          </a:p>
+          <a:p>
+            <a:pPr marL="742950" marR="0" lvl="1" indent="-285750">
+              <a:spcBef>
+                <a:spcPts val="0"/>
+              </a:spcBef>
+              <a:spcAft>
+                <a:spcPts val="0"/>
+              </a:spcAft>
+              <a:buFont typeface="Courier New" charset="0"/>
+              <a:buChar char="o"/>
+            </a:pPr>
+            <a:r>
+              <a:rPr lang="en-US" sz="1200" dirty="0" smtClean="0">
+                <a:effectLst/>
+                <a:latin typeface="Calibri" charset="0"/>
+                <a:ea typeface="Calibri" charset="0"/>
+                <a:cs typeface="Times New Roman" charset="0"/>
+              </a:rPr>
+              <a:t>Identifying where certain flora are located in Maine</a:t>
+            </a:r>
+          </a:p>
+          <a:p>
+            <a:pPr marL="742950" marR="0" lvl="1" indent="-285750">
+              <a:spcBef>
+                <a:spcPts val="0"/>
+              </a:spcBef>
+              <a:spcAft>
+                <a:spcPts val="0"/>
+              </a:spcAft>
+              <a:buFont typeface="Courier New" charset="0"/>
+              <a:buChar char="o"/>
+            </a:pPr>
+            <a:r>
+              <a:rPr lang="en-US" sz="1200" dirty="0" smtClean="0">
+                <a:effectLst/>
+                <a:latin typeface="Calibri" charset="0"/>
+                <a:ea typeface="Calibri" charset="0"/>
+                <a:cs typeface="Times New Roman" charset="0"/>
+              </a:rPr>
+              <a:t>Identifying where in her collections each of the flora are documented</a:t>
+            </a:r>
+          </a:p>
+          <a:p>
+            <a:pPr marL="742950" marR="0" lvl="1" indent="-285750">
+              <a:spcBef>
+                <a:spcPts val="0"/>
+              </a:spcBef>
+              <a:spcAft>
+                <a:spcPts val="0"/>
+              </a:spcAft>
+              <a:buFont typeface="Courier New" charset="0"/>
+              <a:buChar char="o"/>
+            </a:pPr>
+            <a:r>
+              <a:rPr lang="en-US" sz="1200" dirty="0" smtClean="0">
+                <a:effectLst/>
+                <a:latin typeface="Calibri" charset="0"/>
+                <a:ea typeface="Calibri" charset="0"/>
+                <a:cs typeface="Times New Roman" charset="0"/>
+              </a:rPr>
+              <a:t>Determining where she found the most flora</a:t>
+            </a:r>
+          </a:p>
+          <a:p>
+            <a:pPr marL="742950" marR="0" lvl="1" indent="-285750">
+              <a:spcBef>
+                <a:spcPts val="0"/>
+              </a:spcBef>
+              <a:spcAft>
+                <a:spcPts val="0"/>
+              </a:spcAft>
+              <a:buFont typeface="Courier New" charset="0"/>
+              <a:buChar char="o"/>
+            </a:pPr>
+            <a:r>
+              <a:rPr lang="en-US" sz="1200" dirty="0" smtClean="0">
+                <a:effectLst/>
+                <a:latin typeface="Calibri" charset="0"/>
+                <a:ea typeface="Calibri" charset="0"/>
+                <a:cs typeface="Times New Roman" charset="0"/>
+              </a:rPr>
+              <a:t>Determining which were her most active years</a:t>
+            </a:r>
+            <a:endParaRPr lang="en-US" sz="1200" dirty="0">
+              <a:effectLst/>
+              <a:latin typeface="Calibri" charset="0"/>
+              <a:ea typeface="Calibri" charset="0"/>
+              <a:cs typeface="Times New Roman" charset="0"/>
+            </a:endParaRPr>
           </a:p>
         </p:txBody>
       </p:sp>
@@ -885,7 +1325,178 @@
           <a:bodyPr/>
           <a:lstStyle/>
           <a:p>
-            <a:endParaRPr lang="en-US" dirty="0" smtClean="0"/>
+            <a:pPr marL="342900" marR="0" lvl="0" indent="-342900">
+              <a:spcBef>
+                <a:spcPts val="0"/>
+              </a:spcBef>
+              <a:spcAft>
+                <a:spcPts val="0"/>
+              </a:spcAft>
+              <a:buFont typeface="Symbol" charset="2"/>
+              <a:buChar char=""/>
+            </a:pPr>
+            <a:r>
+              <a:rPr lang="en-US" sz="1200" dirty="0" smtClean="0">
+                <a:effectLst/>
+                <a:latin typeface="Calibri" charset="0"/>
+                <a:ea typeface="Calibri" charset="0"/>
+                <a:cs typeface="Times New Roman" charset="0"/>
+              </a:rPr>
+              <a:t>We employed an integrated set of tools to make one super visualization that we will demo at the end of this presentation. We used a variety of interactions and visual effects these would cause</a:t>
+            </a:r>
+          </a:p>
+          <a:p>
+            <a:pPr marL="342900" marR="0" lvl="0" indent="-342900">
+              <a:spcBef>
+                <a:spcPts val="0"/>
+              </a:spcBef>
+              <a:spcAft>
+                <a:spcPts val="0"/>
+              </a:spcAft>
+              <a:buFont typeface="Symbol" charset="2"/>
+              <a:buChar char=""/>
+            </a:pPr>
+            <a:r>
+              <a:rPr lang="en-US" sz="1200" dirty="0" smtClean="0">
+                <a:effectLst/>
+                <a:latin typeface="Calibri" charset="0"/>
+                <a:ea typeface="Calibri" charset="0"/>
+                <a:cs typeface="Times New Roman" charset="0"/>
+              </a:rPr>
+              <a:t>Interactive scaled dots:</a:t>
+            </a:r>
+          </a:p>
+          <a:p>
+            <a:pPr marL="742950" marR="0" lvl="1" indent="-285750">
+              <a:spcBef>
+                <a:spcPts val="0"/>
+              </a:spcBef>
+              <a:spcAft>
+                <a:spcPts val="0"/>
+              </a:spcAft>
+              <a:buFont typeface="Courier New" charset="0"/>
+              <a:buChar char="o"/>
+            </a:pPr>
+            <a:r>
+              <a:rPr lang="en-US" sz="1200" dirty="0" smtClean="0">
+                <a:effectLst/>
+                <a:latin typeface="Calibri" charset="0"/>
+                <a:ea typeface="Calibri" charset="0"/>
+                <a:cs typeface="Times New Roman" charset="0"/>
+              </a:rPr>
+              <a:t>The dots appeared on the map and changed in size based on where the current user selection of samples were taken</a:t>
+            </a:r>
+          </a:p>
+          <a:p>
+            <a:pPr marL="742950" marR="0" lvl="1" indent="-285750">
+              <a:spcBef>
+                <a:spcPts val="0"/>
+              </a:spcBef>
+              <a:spcAft>
+                <a:spcPts val="0"/>
+              </a:spcAft>
+              <a:buFont typeface="Courier New" charset="0"/>
+              <a:buChar char="o"/>
+            </a:pPr>
+            <a:r>
+              <a:rPr lang="en-US" sz="1200" dirty="0" smtClean="0">
+                <a:effectLst/>
+                <a:latin typeface="Calibri" charset="0"/>
+                <a:ea typeface="Calibri" charset="0"/>
+                <a:cs typeface="Times New Roman" charset="0"/>
+              </a:rPr>
+              <a:t>When clicked, relevant information is shown in the town inspector box, which will be discussed momentarily</a:t>
+            </a:r>
+          </a:p>
+          <a:p>
+            <a:pPr marL="742950" marR="0" lvl="1" indent="-285750">
+              <a:spcBef>
+                <a:spcPts val="0"/>
+              </a:spcBef>
+              <a:spcAft>
+                <a:spcPts val="0"/>
+              </a:spcAft>
+              <a:buFont typeface="Courier New" charset="0"/>
+              <a:buChar char="o"/>
+            </a:pPr>
+            <a:r>
+              <a:rPr lang="en-US" sz="1200" dirty="0" smtClean="0">
+                <a:effectLst/>
+                <a:latin typeface="Calibri" charset="0"/>
+                <a:ea typeface="Calibri" charset="0"/>
+                <a:cs typeface="Times New Roman" charset="0"/>
+              </a:rPr>
+              <a:t>In the next week, we hope to implement a zoom feature triggered by clicking on the dots, which will show more detail</a:t>
+            </a:r>
+          </a:p>
+          <a:p>
+            <a:pPr marL="342900" marR="0" lvl="0" indent="-342900">
+              <a:spcBef>
+                <a:spcPts val="0"/>
+              </a:spcBef>
+              <a:spcAft>
+                <a:spcPts val="0"/>
+              </a:spcAft>
+              <a:buFont typeface="Symbol" charset="2"/>
+              <a:buChar char=""/>
+            </a:pPr>
+            <a:r>
+              <a:rPr lang="en-US" sz="1200" dirty="0" smtClean="0">
+                <a:effectLst/>
+                <a:latin typeface="Calibri" charset="0"/>
+                <a:ea typeface="Calibri" charset="0"/>
+                <a:cs typeface="Times New Roman" charset="0"/>
+              </a:rPr>
+              <a:t>Search box:</a:t>
+            </a:r>
+          </a:p>
+          <a:p>
+            <a:pPr marL="742950" marR="0" lvl="1" indent="-285750">
+              <a:spcBef>
+                <a:spcPts val="0"/>
+              </a:spcBef>
+              <a:spcAft>
+                <a:spcPts val="0"/>
+              </a:spcAft>
+              <a:buFont typeface="Courier New" charset="0"/>
+              <a:buChar char="o"/>
+            </a:pPr>
+            <a:r>
+              <a:rPr lang="en-US" sz="1200" dirty="0" smtClean="0">
+                <a:effectLst/>
+                <a:latin typeface="Calibri" charset="0"/>
+                <a:ea typeface="Calibri" charset="0"/>
+                <a:cs typeface="Times New Roman" charset="0"/>
+              </a:rPr>
+              <a:t>Allows searching by current scientific name and common name</a:t>
+            </a:r>
+          </a:p>
+          <a:p>
+            <a:pPr marL="742950" marR="0" lvl="1" indent="-285750">
+              <a:spcBef>
+                <a:spcPts val="0"/>
+              </a:spcBef>
+              <a:spcAft>
+                <a:spcPts val="0"/>
+              </a:spcAft>
+              <a:buFont typeface="Courier New" charset="0"/>
+              <a:buChar char="o"/>
+            </a:pPr>
+            <a:r>
+              <a:rPr lang="en-US" sz="1200" dirty="0" smtClean="0">
+                <a:effectLst/>
+                <a:latin typeface="Calibri" charset="0"/>
+                <a:ea typeface="Calibri" charset="0"/>
+                <a:cs typeface="Times New Roman" charset="0"/>
+              </a:rPr>
+              <a:t>Clicking on specific flora adds to the current selection displayed on map. The user can do this by individual flora, or select all at once. The same process is available for removing flora from the current selection.</a:t>
+            </a:r>
+            <a:endParaRPr lang="en-US" sz="1200" dirty="0">
+              <a:effectLst/>
+              <a:latin typeface="Calibri" charset="0"/>
+              <a:ea typeface="Calibri" charset="0"/>
+              <a:cs typeface="Times New Roman" charset="0"/>
+            </a:endParaRPr>
           </a:p>
         </p:txBody>
       </p:sp>
@@ -969,6 +1580,153 @@
           <a:bodyPr/>
           <a:lstStyle/>
           <a:p>
+            <a:pPr marL="342900" marR="0" lvl="0" indent="-342900">
+              <a:spcBef>
+                <a:spcPts val="0"/>
+              </a:spcBef>
+              <a:spcAft>
+                <a:spcPts val="0"/>
+              </a:spcAft>
+              <a:buFont typeface="Symbol" charset="2"/>
+              <a:buChar char=""/>
+            </a:pPr>
+            <a:r>
+              <a:rPr lang="en-US" sz="1200" dirty="0" smtClean="0">
+                <a:effectLst/>
+                <a:latin typeface="Calibri" charset="0"/>
+                <a:ea typeface="Calibri" charset="0"/>
+                <a:cs typeface="Times New Roman" charset="0"/>
+              </a:rPr>
+              <a:t>Towns:</a:t>
+            </a:r>
+          </a:p>
+          <a:p>
+            <a:pPr marL="742950" marR="0" lvl="1" indent="-285750">
+              <a:spcBef>
+                <a:spcPts val="0"/>
+              </a:spcBef>
+              <a:spcAft>
+                <a:spcPts val="0"/>
+              </a:spcAft>
+              <a:buFont typeface="Courier New" charset="0"/>
+              <a:buChar char="o"/>
+            </a:pPr>
+            <a:r>
+              <a:rPr lang="en-US" sz="1200" dirty="0" smtClean="0">
+                <a:effectLst/>
+                <a:latin typeface="Calibri" charset="0"/>
+                <a:ea typeface="Calibri" charset="0"/>
+                <a:cs typeface="Times New Roman" charset="0"/>
+              </a:rPr>
+              <a:t>On our map, we broke up the state of Maine by town</a:t>
+            </a:r>
+          </a:p>
+          <a:p>
+            <a:pPr marL="742950" marR="0" lvl="1" indent="-285750">
+              <a:spcBef>
+                <a:spcPts val="0"/>
+              </a:spcBef>
+              <a:spcAft>
+                <a:spcPts val="0"/>
+              </a:spcAft>
+              <a:buFont typeface="Courier New" charset="0"/>
+              <a:buChar char="o"/>
+            </a:pPr>
+            <a:r>
+              <a:rPr lang="en-US" sz="1200" dirty="0" smtClean="0">
+                <a:effectLst/>
+                <a:latin typeface="Calibri" charset="0"/>
+                <a:ea typeface="Calibri" charset="0"/>
+                <a:cs typeface="Times New Roman" charset="0"/>
+              </a:rPr>
+              <a:t>Towns have similar capabilities as dots, where moussing over shows a tooltip that displays the town name and a click leads to relevant information being shown in the town inspector</a:t>
+            </a:r>
+          </a:p>
+          <a:p>
+            <a:pPr marL="342900" marR="0" lvl="0" indent="-342900">
+              <a:spcBef>
+                <a:spcPts val="0"/>
+              </a:spcBef>
+              <a:spcAft>
+                <a:spcPts val="0"/>
+              </a:spcAft>
+              <a:buFont typeface="Symbol" charset="2"/>
+              <a:buChar char=""/>
+            </a:pPr>
+            <a:r>
+              <a:rPr lang="en-US" sz="1200" dirty="0" smtClean="0">
+                <a:effectLst/>
+                <a:latin typeface="Calibri" charset="0"/>
+                <a:ea typeface="Calibri" charset="0"/>
+                <a:cs typeface="Times New Roman" charset="0"/>
+              </a:rPr>
+              <a:t>Town Inspector:</a:t>
+            </a:r>
+          </a:p>
+          <a:p>
+            <a:pPr marL="742950" marR="0" lvl="1" indent="-285750">
+              <a:spcBef>
+                <a:spcPts val="0"/>
+              </a:spcBef>
+              <a:spcAft>
+                <a:spcPts val="0"/>
+              </a:spcAft>
+              <a:buFont typeface="Courier New" charset="0"/>
+              <a:buChar char="o"/>
+            </a:pPr>
+            <a:r>
+              <a:rPr lang="en-US" sz="1200" dirty="0" smtClean="0">
+                <a:effectLst/>
+                <a:latin typeface="Calibri" charset="0"/>
+                <a:ea typeface="Calibri" charset="0"/>
+                <a:cs typeface="Times New Roman" charset="0"/>
+              </a:rPr>
+              <a:t>The town inspector shows information about the currently selected town that is relevant to the current selection of flora</a:t>
+            </a:r>
+          </a:p>
+          <a:p>
+            <a:pPr marL="742950" marR="0" lvl="1" indent="-285750">
+              <a:spcBef>
+                <a:spcPts val="0"/>
+              </a:spcBef>
+              <a:spcAft>
+                <a:spcPts val="0"/>
+              </a:spcAft>
+              <a:buFont typeface="Courier New" charset="0"/>
+              <a:buChar char="o"/>
+            </a:pPr>
+            <a:r>
+              <a:rPr lang="en-US" sz="1200" dirty="0" smtClean="0">
+                <a:effectLst/>
+                <a:latin typeface="Calibri" charset="0"/>
+                <a:ea typeface="Calibri" charset="0"/>
+                <a:cs typeface="Times New Roman" charset="0"/>
+              </a:rPr>
+              <a:t>It is a modified version of our initial spread sheet, showing information we deemed most relevant to answering the questions we decided to answer</a:t>
+            </a:r>
+          </a:p>
+          <a:p>
+            <a:pPr marL="742950" marR="0" lvl="1" indent="-285750">
+              <a:spcBef>
+                <a:spcPts val="0"/>
+              </a:spcBef>
+              <a:spcAft>
+                <a:spcPts val="0"/>
+              </a:spcAft>
+              <a:buFont typeface="Courier New" charset="0"/>
+              <a:buChar char="o"/>
+            </a:pPr>
+            <a:r>
+              <a:rPr lang="en-US" sz="1200" dirty="0" smtClean="0">
+                <a:effectLst/>
+                <a:latin typeface="Calibri" charset="0"/>
+                <a:ea typeface="Calibri" charset="0"/>
+                <a:cs typeface="Times New Roman" charset="0"/>
+              </a:rPr>
+              <a:t>You can see on the example in this slide that we show each sample individually, instead of breaking up rows by flora, so that the user can see samples of the same species that were taken in separate years</a:t>
+            </a:r>
+          </a:p>
+          <a:p>
             <a:endParaRPr lang="en-US" dirty="0" smtClean="0"/>
           </a:p>
         </p:txBody>
@@ -1053,7 +1811,199 @@
           <a:bodyPr/>
           <a:lstStyle/>
           <a:p>
-            <a:endParaRPr lang="en-US" dirty="0" smtClean="0"/>
+            <a:pPr marL="342900" marR="0" lvl="0" indent="-342900">
+              <a:spcBef>
+                <a:spcPts val="0"/>
+              </a:spcBef>
+              <a:spcAft>
+                <a:spcPts val="0"/>
+              </a:spcAft>
+              <a:buFont typeface="Symbol" charset="2"/>
+              <a:buChar char=""/>
+            </a:pPr>
+            <a:r>
+              <a:rPr lang="en-US" sz="1200" dirty="0" smtClean="0">
+                <a:effectLst/>
+                <a:latin typeface="Calibri" charset="0"/>
+                <a:ea typeface="Calibri" charset="0"/>
+                <a:cs typeface="Times New Roman" charset="0"/>
+              </a:rPr>
+              <a:t>This slide is our ideas for future work, along with work we plan on implementing in the next week</a:t>
+            </a:r>
+          </a:p>
+          <a:p>
+            <a:pPr marL="342900" marR="0" lvl="0" indent="-342900">
+              <a:spcBef>
+                <a:spcPts val="0"/>
+              </a:spcBef>
+              <a:spcAft>
+                <a:spcPts val="0"/>
+              </a:spcAft>
+              <a:buFont typeface="Symbol" charset="2"/>
+              <a:buChar char=""/>
+            </a:pPr>
+            <a:r>
+              <a:rPr lang="en-US" sz="1200" dirty="0" smtClean="0">
+                <a:effectLst/>
+                <a:latin typeface="Calibri" charset="0"/>
+                <a:ea typeface="Calibri" charset="0"/>
+                <a:cs typeface="Times New Roman" charset="0"/>
+              </a:rPr>
+              <a:t>Year Slider:</a:t>
+            </a:r>
+          </a:p>
+          <a:p>
+            <a:pPr marL="742950" marR="0" lvl="1" indent="-285750">
+              <a:spcBef>
+                <a:spcPts val="0"/>
+              </a:spcBef>
+              <a:spcAft>
+                <a:spcPts val="0"/>
+              </a:spcAft>
+              <a:buFont typeface="Courier New" charset="0"/>
+              <a:buChar char="o"/>
+            </a:pPr>
+            <a:r>
+              <a:rPr lang="en-US" sz="1200" dirty="0" smtClean="0">
+                <a:effectLst/>
+                <a:latin typeface="Calibri" charset="0"/>
+                <a:ea typeface="Calibri" charset="0"/>
+                <a:cs typeface="Times New Roman" charset="0"/>
+              </a:rPr>
+              <a:t>Enables user to determine time range of samples they view</a:t>
+            </a:r>
+          </a:p>
+          <a:p>
+            <a:pPr marL="742950" marR="0" lvl="1" indent="-285750">
+              <a:spcBef>
+                <a:spcPts val="0"/>
+              </a:spcBef>
+              <a:spcAft>
+                <a:spcPts val="0"/>
+              </a:spcAft>
+              <a:buFont typeface="Courier New" charset="0"/>
+              <a:buChar char="o"/>
+            </a:pPr>
+            <a:r>
+              <a:rPr lang="en-US" sz="1200" dirty="0" smtClean="0">
+                <a:effectLst/>
+                <a:latin typeface="Calibri" charset="0"/>
+                <a:ea typeface="Calibri" charset="0"/>
+                <a:cs typeface="Times New Roman" charset="0"/>
+              </a:rPr>
+              <a:t>This will alter the display on the map and the town inspector, as samples of flora that are selected but are not within the range will not be included</a:t>
+            </a:r>
+          </a:p>
+          <a:p>
+            <a:pPr marL="742950" marR="0" lvl="1" indent="-285750">
+              <a:spcBef>
+                <a:spcPts val="0"/>
+              </a:spcBef>
+              <a:spcAft>
+                <a:spcPts val="0"/>
+              </a:spcAft>
+              <a:buFont typeface="Courier New" charset="0"/>
+              <a:buChar char="o"/>
+            </a:pPr>
+            <a:r>
+              <a:rPr lang="en-US" sz="1200" dirty="0" smtClean="0">
+                <a:effectLst/>
+                <a:latin typeface="Calibri" charset="0"/>
+                <a:ea typeface="Calibri" charset="0"/>
+                <a:cs typeface="Times New Roman" charset="0"/>
+              </a:rPr>
+              <a:t>While we do not believe that we can do this in the next week, we believe it would helpful to user to implement an animated time lapse so that they can watch how sampling changed annually without having to manually alter the settings each time they want to increase the year</a:t>
+            </a:r>
+          </a:p>
+          <a:p>
+            <a:pPr marL="342900" marR="0" lvl="0" indent="-342900">
+              <a:spcBef>
+                <a:spcPts val="0"/>
+              </a:spcBef>
+              <a:spcAft>
+                <a:spcPts val="0"/>
+              </a:spcAft>
+              <a:buFont typeface="Symbol" charset="2"/>
+              <a:buChar char=""/>
+            </a:pPr>
+            <a:r>
+              <a:rPr lang="en-US" sz="1200" dirty="0" smtClean="0">
+                <a:effectLst/>
+                <a:latin typeface="Calibri" charset="0"/>
+                <a:ea typeface="Calibri" charset="0"/>
+                <a:cs typeface="Times New Roman" charset="0"/>
+              </a:rPr>
+              <a:t>Sample distribution doughnut char:</a:t>
+            </a:r>
+          </a:p>
+          <a:p>
+            <a:pPr marL="742950" marR="0" lvl="1" indent="-285750">
+              <a:spcBef>
+                <a:spcPts val="0"/>
+              </a:spcBef>
+              <a:spcAft>
+                <a:spcPts val="0"/>
+              </a:spcAft>
+              <a:buFont typeface="Courier New" charset="0"/>
+              <a:buChar char="o"/>
+            </a:pPr>
+            <a:r>
+              <a:rPr lang="en-US" sz="1200" dirty="0" smtClean="0">
+                <a:effectLst/>
+                <a:latin typeface="Calibri" charset="0"/>
+                <a:ea typeface="Calibri" charset="0"/>
+                <a:cs typeface="Times New Roman" charset="0"/>
+              </a:rPr>
+              <a:t>When zoomed in due to a click on a dot, the dots will disappear and the selected town will show a doughnut chart showing the relative number of samples taken within the town</a:t>
+            </a:r>
+          </a:p>
+          <a:p>
+            <a:pPr marL="342900" marR="0" lvl="0" indent="-342900">
+              <a:spcBef>
+                <a:spcPts val="0"/>
+              </a:spcBef>
+              <a:spcAft>
+                <a:spcPts val="0"/>
+              </a:spcAft>
+              <a:buFont typeface="Symbol" charset="2"/>
+              <a:buChar char=""/>
+            </a:pPr>
+            <a:r>
+              <a:rPr lang="en-US" sz="1200" dirty="0" smtClean="0">
+                <a:effectLst/>
+                <a:latin typeface="Calibri" charset="0"/>
+                <a:ea typeface="Calibri" charset="0"/>
+                <a:cs typeface="Times New Roman" charset="0"/>
+              </a:rPr>
+              <a:t>Debugging</a:t>
+            </a:r>
+          </a:p>
+          <a:p>
+            <a:pPr marL="742950" marR="0" lvl="1" indent="-285750">
+              <a:spcBef>
+                <a:spcPts val="0"/>
+              </a:spcBef>
+              <a:spcAft>
+                <a:spcPts val="0"/>
+              </a:spcAft>
+              <a:buFont typeface="Courier New" charset="0"/>
+              <a:buChar char="o"/>
+            </a:pPr>
+            <a:r>
+              <a:rPr lang="en-US" sz="1200" dirty="0" smtClean="0">
+                <a:effectLst/>
+                <a:latin typeface="Calibri" charset="0"/>
+                <a:ea typeface="Calibri" charset="0"/>
+                <a:cs typeface="Times New Roman" charset="0"/>
+              </a:rPr>
+              <a:t>Of course, our code is not perfect and we still have to work out some bugs</a:t>
+            </a:r>
+            <a:endParaRPr lang="en-US" sz="1200" dirty="0">
+              <a:effectLst/>
+              <a:latin typeface="Calibri" charset="0"/>
+              <a:ea typeface="Calibri" charset="0"/>
+              <a:cs typeface="Times New Roman" charset="0"/>
+            </a:endParaRPr>
           </a:p>
         </p:txBody>
       </p:sp>
@@ -1137,7 +2087,28 @@
           <a:bodyPr/>
           <a:lstStyle/>
           <a:p>
-            <a:endParaRPr lang="en-US" dirty="0" smtClean="0"/>
+            <a:pPr lvl="0"/>
+            <a:r>
+              <a:rPr lang="en-US" sz="1200" kern="1200" dirty="0" smtClean="0">
+                <a:solidFill>
+                  <a:schemeClr val="tx1"/>
+                </a:solidFill>
+                <a:effectLst/>
+                <a:latin typeface="+mn-lt"/>
+                <a:ea typeface="+mn-ea"/>
+                <a:cs typeface="+mn-cs"/>
+              </a:rPr>
+              <a:t>This is what we hope to make our zoomed in view look like in the next week</a:t>
+            </a:r>
+            <a:endParaRPr lang="en-US" sz="1200" kern="1200" dirty="0">
+              <a:solidFill>
+                <a:schemeClr val="tx1"/>
+              </a:solidFill>
+              <a:effectLst/>
+              <a:latin typeface="+mn-lt"/>
+              <a:ea typeface="+mn-ea"/>
+              <a:cs typeface="+mn-cs"/>
+            </a:endParaRPr>
           </a:p>
         </p:txBody>
       </p:sp>
@@ -1158,7 +2129,7 @@
           <a:p>
             <a:fld id="{2C036F5E-38D3-8047-B722-F0D8325111E0}" type="slidenum">
               <a:rPr lang="en-US" smtClean="0"/>
-              <a:t>9</a:t>
+              <a:t>8</a:t>
             </a:fld>
             <a:endParaRPr lang="en-US"/>
           </a:p>
@@ -1167,7 +2138,7 @@
     </p:spTree>
     <p:extLst>
       <p:ext uri="{BB962C8B-B14F-4D97-AF65-F5344CB8AC3E}">
-        <p14:creationId xmlns:p14="http://schemas.microsoft.com/office/powerpoint/2010/main" val="1501429437"/>
+        <p14:creationId xmlns:p14="http://schemas.microsoft.com/office/powerpoint/2010/main" val="1697945137"/>
       </p:ext>
     </p:extLst>
   </p:cSld>
@@ -1221,7 +2192,565 @@
           <a:bodyPr/>
           <a:lstStyle/>
           <a:p>
-            <a:endParaRPr lang="en-US" baseline="0" dirty="0" smtClean="0"/>
+            <a:pPr marL="342900" marR="0" lvl="0" indent="-342900">
+              <a:spcBef>
+                <a:spcPts val="0"/>
+              </a:spcBef>
+              <a:spcAft>
+                <a:spcPts val="0"/>
+              </a:spcAft>
+              <a:buFont typeface="Symbol" charset="2"/>
+              <a:buChar char=""/>
+            </a:pPr>
+            <a:r>
+              <a:rPr lang="en-US" sz="1200" dirty="0" smtClean="0">
+                <a:effectLst/>
+                <a:latin typeface="Calibri" charset="0"/>
+                <a:ea typeface="Calibri" charset="0"/>
+                <a:cs typeface="Times New Roman" charset="0"/>
+              </a:rPr>
+              <a:t>We believe that we answered each of these primary questions with our visualization</a:t>
+            </a:r>
+          </a:p>
+          <a:p>
+            <a:pPr marL="742950" marR="0" lvl="1" indent="-285750">
+              <a:spcBef>
+                <a:spcPts val="0"/>
+              </a:spcBef>
+              <a:spcAft>
+                <a:spcPts val="0"/>
+              </a:spcAft>
+              <a:buFont typeface="Courier New" charset="0"/>
+              <a:buChar char="o"/>
+            </a:pPr>
+            <a:r>
+              <a:rPr lang="en-US" sz="1200" dirty="0" smtClean="0">
+                <a:effectLst/>
+                <a:latin typeface="Calibri" charset="0"/>
+                <a:ea typeface="Calibri" charset="0"/>
+                <a:cs typeface="Times New Roman" charset="0"/>
+              </a:rPr>
+              <a:t>Determining where Kate Furbish went and when</a:t>
+            </a:r>
+          </a:p>
+          <a:p>
+            <a:pPr marL="1143000" marR="0" lvl="2" indent="-228600">
+              <a:spcBef>
+                <a:spcPts val="0"/>
+              </a:spcBef>
+              <a:spcAft>
+                <a:spcPts val="0"/>
+              </a:spcAft>
+              <a:buFont typeface="Wingdings" charset="2"/>
+              <a:buChar char=""/>
+            </a:pPr>
+            <a:r>
+              <a:rPr lang="en-US" sz="1200" dirty="0" smtClean="0">
+                <a:effectLst/>
+                <a:latin typeface="Calibri" charset="0"/>
+                <a:ea typeface="Calibri" charset="0"/>
+                <a:cs typeface="Times New Roman" charset="0"/>
+              </a:rPr>
+              <a:t>By selecting all flora and changing the selected year, users can see where samples were collected, how many were taken, and when they were collected, and compare these over time</a:t>
+            </a:r>
+          </a:p>
+          <a:p>
+            <a:pPr marL="742950" marR="0" lvl="1" indent="-285750">
+              <a:spcBef>
+                <a:spcPts val="0"/>
+              </a:spcBef>
+              <a:spcAft>
+                <a:spcPts val="0"/>
+              </a:spcAft>
+              <a:buFont typeface="Courier New" charset="0"/>
+              <a:buChar char="o"/>
+            </a:pPr>
+            <a:r>
+              <a:rPr lang="en-US" sz="1200" dirty="0" smtClean="0">
+                <a:effectLst/>
+                <a:latin typeface="Calibri" charset="0"/>
+                <a:ea typeface="Calibri" charset="0"/>
+                <a:cs typeface="Times New Roman" charset="0"/>
+              </a:rPr>
+              <a:t>Identifying where certain flora are located in Maine</a:t>
+            </a:r>
+          </a:p>
+          <a:p>
+            <a:pPr marL="1143000" marR="0" lvl="2" indent="-228600">
+              <a:spcBef>
+                <a:spcPts val="0"/>
+              </a:spcBef>
+              <a:spcAft>
+                <a:spcPts val="0"/>
+              </a:spcAft>
+              <a:buFont typeface="Wingdings" charset="2"/>
+              <a:buChar char=""/>
+            </a:pPr>
+            <a:r>
+              <a:rPr lang="en-US" sz="1200" dirty="0" smtClean="0">
+                <a:effectLst/>
+                <a:latin typeface="Calibri" charset="0"/>
+                <a:ea typeface="Calibri" charset="0"/>
+                <a:cs typeface="Times New Roman" charset="0"/>
+              </a:rPr>
+              <a:t>We believe this is afforded by allowing the user to select any flora, which will automatically be visualized on the map in the location where samples were taken</a:t>
+            </a:r>
+          </a:p>
+          <a:p>
+            <a:pPr marL="742950" marR="0" lvl="1" indent="-285750">
+              <a:spcBef>
+                <a:spcPts val="0"/>
+              </a:spcBef>
+              <a:spcAft>
+                <a:spcPts val="0"/>
+              </a:spcAft>
+              <a:buFont typeface="Courier New" charset="0"/>
+              <a:buChar char="o"/>
+            </a:pPr>
+            <a:r>
+              <a:rPr lang="en-US" sz="1200" dirty="0" smtClean="0">
+                <a:effectLst/>
+                <a:latin typeface="Calibri" charset="0"/>
+                <a:ea typeface="Calibri" charset="0"/>
+                <a:cs typeface="Times New Roman" charset="0"/>
+              </a:rPr>
+              <a:t>Identifying where in her collections each of the flora are documented</a:t>
+            </a:r>
+          </a:p>
+          <a:p>
+            <a:pPr marL="1143000" marR="0" lvl="2" indent="-228600">
+              <a:spcBef>
+                <a:spcPts val="0"/>
+              </a:spcBef>
+              <a:spcAft>
+                <a:spcPts val="0"/>
+              </a:spcAft>
+              <a:buFont typeface="Wingdings" charset="2"/>
+              <a:buChar char=""/>
+            </a:pPr>
+            <a:r>
+              <a:rPr lang="en-US" sz="1200" dirty="0" smtClean="0">
+                <a:effectLst/>
+                <a:latin typeface="Calibri" charset="0"/>
+                <a:ea typeface="Calibri" charset="0"/>
+                <a:cs typeface="Times New Roman" charset="0"/>
+              </a:rPr>
+              <a:t>By selecting flora then examining the results in the town inspector, the user can see where to look up a species in the collections</a:t>
+            </a:r>
+          </a:p>
+          <a:p>
+            <a:pPr marL="742950" marR="0" lvl="1" indent="-285750">
+              <a:spcBef>
+                <a:spcPts val="0"/>
+              </a:spcBef>
+              <a:spcAft>
+                <a:spcPts val="0"/>
+              </a:spcAft>
+              <a:buFont typeface="Courier New" charset="0"/>
+              <a:buChar char="o"/>
+            </a:pPr>
+            <a:r>
+              <a:rPr lang="en-US" sz="1200" dirty="0" smtClean="0">
+                <a:effectLst/>
+                <a:latin typeface="Calibri" charset="0"/>
+                <a:ea typeface="Calibri" charset="0"/>
+                <a:cs typeface="Times New Roman" charset="0"/>
+              </a:rPr>
+              <a:t>Determining where she found the most flora</a:t>
+            </a:r>
+          </a:p>
+          <a:p>
+            <a:pPr marL="1143000" marR="0" lvl="2" indent="-228600">
+              <a:spcBef>
+                <a:spcPts val="0"/>
+              </a:spcBef>
+              <a:spcAft>
+                <a:spcPts val="0"/>
+              </a:spcAft>
+              <a:buFont typeface="Wingdings" charset="2"/>
+              <a:buChar char=""/>
+            </a:pPr>
+            <a:r>
+              <a:rPr lang="en-US" sz="1200" dirty="0" smtClean="0">
+                <a:effectLst/>
+                <a:latin typeface="Calibri" charset="0"/>
+                <a:ea typeface="Calibri" charset="0"/>
+                <a:cs typeface="Times New Roman" charset="0"/>
+              </a:rPr>
+              <a:t>This can again be addressed by selecting all flora then examining the map</a:t>
+            </a:r>
+          </a:p>
+          <a:p>
+            <a:pPr marL="742950" marR="0" lvl="1" indent="-285750">
+              <a:spcBef>
+                <a:spcPts val="0"/>
+              </a:spcBef>
+              <a:spcAft>
+                <a:spcPts val="0"/>
+              </a:spcAft>
+              <a:buFont typeface="Courier New" charset="0"/>
+              <a:buChar char="o"/>
+            </a:pPr>
+            <a:r>
+              <a:rPr lang="en-US" sz="1200" dirty="0" smtClean="0">
+                <a:effectLst/>
+                <a:latin typeface="Calibri" charset="0"/>
+                <a:ea typeface="Calibri" charset="0"/>
+                <a:cs typeface="Times New Roman" charset="0"/>
+              </a:rPr>
+              <a:t>Determining which were her most active years</a:t>
+            </a:r>
+          </a:p>
+          <a:p>
+            <a:pPr marL="1143000" marR="0" lvl="2" indent="-228600">
+              <a:spcBef>
+                <a:spcPts val="0"/>
+              </a:spcBef>
+              <a:spcAft>
+                <a:spcPts val="0"/>
+              </a:spcAft>
+              <a:buFont typeface="Wingdings" charset="2"/>
+              <a:buChar char=""/>
+            </a:pPr>
+            <a:r>
+              <a:rPr lang="en-US" sz="1200" dirty="0" smtClean="0">
+                <a:effectLst/>
+                <a:latin typeface="Calibri" charset="0"/>
+                <a:ea typeface="Calibri" charset="0"/>
+                <a:cs typeface="Times New Roman" charset="0"/>
+              </a:rPr>
+              <a:t>By altering the time slider, the user will be able to see how many samples were taken year by year and compare relative amounts</a:t>
+            </a:r>
+            <a:endParaRPr lang="en-US" sz="1200" dirty="0">
+              <a:effectLst/>
+              <a:latin typeface="Calibri" charset="0"/>
+              <a:ea typeface="Calibri" charset="0"/>
+              <a:cs typeface="Times New Roman" charset="0"/>
+            </a:endParaRPr>
+          </a:p>
+        </p:txBody>
+      </p:sp>
+      <p:sp>
+        <p:nvSpPr>
+          <p:cNvPr id="4" name="Slide Number Placeholder 3"/>
+          <p:cNvSpPr>
+            <a:spLocks noGrp="1"/>
+          </p:cNvSpPr>
+          <p:nvPr>
+            <p:ph type="sldNum" sz="quarter" idx="10"/>
+          </p:nvPr>
+        </p:nvSpPr>
+        <p:spPr/>
+        <p:txBody>
+          <a:bodyPr/>
+          <a:lstStyle/>
+          <a:p>
+            <a:fld id="{2C036F5E-38D3-8047-B722-F0D8325111E0}" type="slidenum">
+              <a:rPr lang="en-US" smtClean="0"/>
+              <a:t>9</a:t>
+            </a:fld>
+            <a:endParaRPr lang="en-US"/>
+          </a:p>
+        </p:txBody>
+      </p:sp>
+    </p:spTree>
+    <p:extLst>
+      <p:ext uri="{BB962C8B-B14F-4D97-AF65-F5344CB8AC3E}">
+        <p14:creationId xmlns:p14="http://schemas.microsoft.com/office/powerpoint/2010/main" val="1501429437"/>
+      </p:ext>
+    </p:extLst>
+  </p:cSld>
+  <p:clrMapOvr>
+    <a:masterClrMapping/>
+  </p:clrMapOvr>
+</p:notes>
+</file>
+
+<file path=ppt/notesSlides/notesSlide9.xml><?xml version="1.0" encoding="utf-8"?>
+<p:notes xmlns:a="http://schemas.openxmlformats.org/drawingml/2006/main" xmlns:r="http://schemas.openxmlformats.org/officeDocument/2006/relationships" xmlns:p="http://schemas.openxmlformats.org/presentationml/2006/main">
+  <p:cSld>
+    <p:spTree>
+      <p:nvGrpSpPr>
+        <p:cNvPr id="1" name=""/>
+        <p:cNvGrpSpPr/>
+        <p:nvPr/>
+      </p:nvGrpSpPr>
+      <p:grpSpPr>
+        <a:xfrm>
+          <a:off x="0" y="0"/>
+          <a:ext cx="0" cy="0"/>
+          <a:chOff x="0" y="0"/>
+          <a:chExt cx="0" cy="0"/>
+        </a:xfrm>
+      </p:grpSpPr>
+      <p:sp>
+        <p:nvSpPr>
+          <p:cNvPr id="2" name="Slide Image Placeholder 1"/>
+          <p:cNvSpPr>
+            <a:spLocks noGrp="1" noRot="1" noChangeAspect="1"/>
+          </p:cNvSpPr>
+          <p:nvPr>
+            <p:ph type="sldImg"/>
+          </p:nvPr>
+        </p:nvSpPr>
+        <p:spPr/>
+      </p:sp>
+      <p:sp>
+        <p:nvSpPr>
+          <p:cNvPr id="3" name="Notes Placeholder 2"/>
+          <p:cNvSpPr>
+            <a:spLocks noGrp="1"/>
+          </p:cNvSpPr>
+          <p:nvPr>
+            <p:ph type="body" idx="1"/>
+          </p:nvPr>
+        </p:nvSpPr>
+        <p:spPr/>
+        <p:txBody>
+          <a:bodyPr/>
+          <a:lstStyle/>
+          <a:p>
+            <a:pPr marL="342900" marR="0" lvl="0" indent="-342900">
+              <a:spcBef>
+                <a:spcPts val="0"/>
+              </a:spcBef>
+              <a:spcAft>
+                <a:spcPts val="0"/>
+              </a:spcAft>
+              <a:buFont typeface="Symbol" charset="2"/>
+              <a:buChar char=""/>
+            </a:pPr>
+            <a:r>
+              <a:rPr lang="en-US" sz="1200" dirty="0" smtClean="0">
+                <a:effectLst/>
+                <a:latin typeface="Calibri" charset="0"/>
+                <a:ea typeface="Calibri" charset="0"/>
+                <a:cs typeface="Times New Roman" charset="0"/>
+              </a:rPr>
+              <a:t>Searching/ filtering</a:t>
+            </a:r>
+          </a:p>
+          <a:p>
+            <a:pPr marL="742950" marR="0" lvl="1" indent="-285750">
+              <a:spcBef>
+                <a:spcPts val="0"/>
+              </a:spcBef>
+              <a:spcAft>
+                <a:spcPts val="0"/>
+              </a:spcAft>
+              <a:buFont typeface="Courier New" charset="0"/>
+              <a:buChar char="o"/>
+            </a:pPr>
+            <a:r>
+              <a:rPr lang="en-US" sz="1200" dirty="0" smtClean="0">
+                <a:effectLst/>
+                <a:latin typeface="Calibri" charset="0"/>
+                <a:ea typeface="Calibri" charset="0"/>
+                <a:cs typeface="Times New Roman" charset="0"/>
+              </a:rPr>
+              <a:t>Go Tucker go</a:t>
+            </a:r>
+          </a:p>
+          <a:p>
+            <a:pPr marL="342900" marR="0" lvl="0" indent="-342900">
+              <a:spcBef>
+                <a:spcPts val="0"/>
+              </a:spcBef>
+              <a:spcAft>
+                <a:spcPts val="0"/>
+              </a:spcAft>
+              <a:buFont typeface="Symbol" charset="2"/>
+              <a:buChar char=""/>
+            </a:pPr>
+            <a:r>
+              <a:rPr lang="en-US" sz="1200" dirty="0" err="1" smtClean="0">
+                <a:effectLst/>
+                <a:latin typeface="Calibri" charset="0"/>
+                <a:ea typeface="Calibri" charset="0"/>
+                <a:cs typeface="Times New Roman" charset="0"/>
+              </a:rPr>
+              <a:t>GeoJSON</a:t>
+            </a:r>
+            <a:endParaRPr lang="en-US" sz="1200" dirty="0" smtClean="0">
+              <a:effectLst/>
+              <a:latin typeface="Calibri" charset="0"/>
+              <a:ea typeface="Calibri" charset="0"/>
+              <a:cs typeface="Times New Roman" charset="0"/>
+            </a:endParaRPr>
+          </a:p>
+          <a:p>
+            <a:pPr marL="742950" marR="0" lvl="1" indent="-285750">
+              <a:spcBef>
+                <a:spcPts val="0"/>
+              </a:spcBef>
+              <a:spcAft>
+                <a:spcPts val="0"/>
+              </a:spcAft>
+              <a:buFont typeface="Courier New" charset="0"/>
+              <a:buChar char="o"/>
+            </a:pPr>
+            <a:r>
+              <a:rPr lang="en-US" sz="1200" dirty="0" smtClean="0">
+                <a:effectLst/>
+                <a:latin typeface="Calibri" charset="0"/>
+                <a:ea typeface="Calibri" charset="0"/>
+                <a:cs typeface="Times New Roman" charset="0"/>
+              </a:rPr>
+              <a:t>We spent a lot of time learning how to take shape files provided by state governments, converting them appropriately, and then using these to visually represent the state of Maine by town</a:t>
+            </a:r>
+          </a:p>
+          <a:p>
+            <a:pPr marL="742950" marR="0" lvl="1" indent="-285750">
+              <a:spcBef>
+                <a:spcPts val="0"/>
+              </a:spcBef>
+              <a:spcAft>
+                <a:spcPts val="0"/>
+              </a:spcAft>
+              <a:buFont typeface="Courier New" charset="0"/>
+              <a:buChar char="o"/>
+            </a:pPr>
+            <a:r>
+              <a:rPr lang="en-US" sz="1200" dirty="0" smtClean="0">
+                <a:effectLst/>
+                <a:latin typeface="Calibri" charset="0"/>
+                <a:ea typeface="Calibri" charset="0"/>
+                <a:cs typeface="Times New Roman" charset="0"/>
+              </a:rPr>
+              <a:t>We are also in the process of learning how to take this data and increase the image accurately and consistently</a:t>
+            </a:r>
+          </a:p>
+          <a:p>
+            <a:pPr marL="342900" marR="0" lvl="0" indent="-342900">
+              <a:spcBef>
+                <a:spcPts val="0"/>
+              </a:spcBef>
+              <a:spcAft>
+                <a:spcPts val="0"/>
+              </a:spcAft>
+              <a:buFont typeface="Symbol" charset="2"/>
+              <a:buChar char=""/>
+            </a:pPr>
+            <a:r>
+              <a:rPr lang="en-US" sz="1200" dirty="0" smtClean="0">
+                <a:effectLst/>
+                <a:latin typeface="Calibri" charset="0"/>
+                <a:ea typeface="Calibri" charset="0"/>
+                <a:cs typeface="Times New Roman" charset="0"/>
+              </a:rPr>
+              <a:t>GitHub</a:t>
+            </a:r>
+          </a:p>
+          <a:p>
+            <a:pPr marL="742950" marR="0" lvl="1" indent="-285750">
+              <a:spcBef>
+                <a:spcPts val="0"/>
+              </a:spcBef>
+              <a:spcAft>
+                <a:spcPts val="0"/>
+              </a:spcAft>
+              <a:buFont typeface="Courier New" charset="0"/>
+              <a:buChar char="o"/>
+            </a:pPr>
+            <a:r>
+              <a:rPr lang="en-US" sz="1200" dirty="0" smtClean="0">
+                <a:effectLst/>
+                <a:latin typeface="Calibri" charset="0"/>
+                <a:ea typeface="Calibri" charset="0"/>
+                <a:cs typeface="Times New Roman" charset="0"/>
+              </a:rPr>
+              <a:t>Before this project, Sophie and Tucker were very unfamiliar with the use of GitHub, especially through the terminal, for version control and collaboration</a:t>
+            </a:r>
+          </a:p>
+          <a:p>
+            <a:pPr marL="342900" marR="0" lvl="0" indent="-342900">
+              <a:spcBef>
+                <a:spcPts val="0"/>
+              </a:spcBef>
+              <a:spcAft>
+                <a:spcPts val="0"/>
+              </a:spcAft>
+              <a:buFont typeface="Symbol" charset="2"/>
+              <a:buChar char=""/>
+            </a:pPr>
+            <a:r>
+              <a:rPr lang="en-US" sz="1200" dirty="0" smtClean="0">
+                <a:effectLst/>
+                <a:latin typeface="Calibri" charset="0"/>
+                <a:ea typeface="Calibri" charset="0"/>
+                <a:cs typeface="Times New Roman" charset="0"/>
+              </a:rPr>
+              <a:t>Message Passing</a:t>
+            </a:r>
+          </a:p>
+          <a:p>
+            <a:pPr marL="742950" marR="0" lvl="1" indent="-285750">
+              <a:spcBef>
+                <a:spcPts val="0"/>
+              </a:spcBef>
+              <a:spcAft>
+                <a:spcPts val="0"/>
+              </a:spcAft>
+              <a:buFont typeface="Courier New" charset="0"/>
+              <a:buChar char="o"/>
+            </a:pPr>
+            <a:r>
+              <a:rPr lang="en-US" sz="1200" dirty="0" smtClean="0">
+                <a:effectLst/>
+                <a:latin typeface="Calibri" charset="0"/>
+                <a:ea typeface="Calibri" charset="0"/>
+                <a:cs typeface="Times New Roman" charset="0"/>
+              </a:rPr>
+              <a:t>Go Tucker Go</a:t>
+            </a:r>
+          </a:p>
+          <a:p>
+            <a:pPr marL="342900" marR="0" lvl="0" indent="-342900">
+              <a:spcBef>
+                <a:spcPts val="0"/>
+              </a:spcBef>
+              <a:spcAft>
+                <a:spcPts val="0"/>
+              </a:spcAft>
+              <a:buFont typeface="Symbol" charset="2"/>
+              <a:buChar char=""/>
+            </a:pPr>
+            <a:r>
+              <a:rPr lang="en-US" sz="1200" dirty="0" smtClean="0">
+                <a:effectLst/>
+                <a:latin typeface="Calibri" charset="0"/>
+                <a:ea typeface="Calibri" charset="0"/>
+                <a:cs typeface="Times New Roman" charset="0"/>
+              </a:rPr>
+              <a:t>Range Slider</a:t>
+            </a:r>
+          </a:p>
+          <a:p>
+            <a:pPr marL="742950" marR="0" lvl="1" indent="-285750">
+              <a:spcBef>
+                <a:spcPts val="0"/>
+              </a:spcBef>
+              <a:spcAft>
+                <a:spcPts val="0"/>
+              </a:spcAft>
+              <a:buFont typeface="Courier New" charset="0"/>
+              <a:buChar char="o"/>
+            </a:pPr>
+            <a:r>
+              <a:rPr lang="en-US" sz="1200" dirty="0" smtClean="0">
+                <a:effectLst/>
+                <a:latin typeface="Calibri" charset="0"/>
+                <a:ea typeface="Calibri" charset="0"/>
+                <a:cs typeface="Times New Roman" charset="0"/>
+              </a:rPr>
+              <a:t>Go Marcus Go</a:t>
+            </a:r>
+            <a:endParaRPr lang="en-US" sz="1200" dirty="0">
+              <a:effectLst/>
+              <a:latin typeface="Calibri" charset="0"/>
+              <a:ea typeface="Calibri" charset="0"/>
+              <a:cs typeface="Times New Roman" charset="0"/>
+            </a:endParaRPr>
           </a:p>
         </p:txBody>
       </p:sp>
@@ -7251,15 +8780,7 @@
           <a:p>
             <a:r>
               <a:rPr lang="en-US" dirty="0" smtClean="0"/>
-              <a:t>New </a:t>
-            </a:r>
-            <a:r>
-              <a:rPr lang="en-US" dirty="0" smtClean="0"/>
-              <a:t>skills that </a:t>
-            </a:r>
-            <a:r>
-              <a:rPr lang="en-US" dirty="0" smtClean="0"/>
-              <a:t>we learned!</a:t>
+              <a:t>New skills that we learned!</a:t>
             </a:r>
             <a:endParaRPr lang="en-US" dirty="0"/>
           </a:p>
@@ -7508,7 +9029,9 @@
           <a:p>
             <a:pPr algn="ctr"/>
             <a:r>
-              <a:rPr lang="en-US" dirty="0" smtClean="0"/>
+              <a:rPr lang="en-US" dirty="0" smtClean="0">
+                <a:hlinkClick r:id="rId2"/>
+              </a:rPr>
               <a:t>Demo</a:t>
             </a:r>
             <a:endParaRPr lang="en-US" dirty="0"/>
@@ -7525,6 +9048,13 @@
   <p:clrMapOvr>
     <a:masterClrMapping/>
   </p:clrMapOvr>
+  <p:timing>
+    <p:tnLst>
+      <p:par>
+        <p:cTn id="1" dur="indefinite" restart="never" nodeType="tmRoot"/>
+      </p:par>
+    </p:tnLst>
+  </p:timing>
 </p:sld>
 </file>
 
@@ -7581,109 +9111,28 @@
         <p:spPr/>
         <p:txBody>
           <a:bodyPr>
-            <a:normAutofit lnSpcReduction="10000"/>
+            <a:normAutofit/>
           </a:bodyPr>
           <a:lstStyle/>
           <a:p>
             <a:r>
-              <a:rPr lang="en-US" dirty="0" smtClean="0"/>
-              <a:t>Dataset </a:t>
-            </a:r>
-            <a:r>
-              <a:rPr lang="en-US" dirty="0"/>
-              <a:t>created from Bowdoin's collection of Kate </a:t>
-            </a:r>
-            <a:r>
-              <a:rPr lang="en-US" dirty="0" err="1"/>
-              <a:t>Furbish's</a:t>
-            </a:r>
-            <a:r>
-              <a:rPr lang="en-US" dirty="0"/>
-              <a:t> </a:t>
-            </a:r>
-            <a:r>
-              <a:rPr lang="en-US" dirty="0" err="1"/>
-              <a:t>botanitcal</a:t>
-            </a:r>
-            <a:r>
-              <a:rPr lang="en-US" dirty="0"/>
-              <a:t> </a:t>
-            </a:r>
-            <a:r>
-              <a:rPr lang="en-US" dirty="0" smtClean="0"/>
-              <a:t>drawings</a:t>
-            </a:r>
-          </a:p>
-          <a:p>
-            <a:r>
-              <a:rPr lang="en-US" dirty="0" smtClean="0"/>
-              <a:t>Kate </a:t>
-            </a:r>
-            <a:r>
-              <a:rPr lang="en-US" dirty="0"/>
-              <a:t>Furbish was a botanist from Brunswick, </a:t>
-            </a:r>
-            <a:r>
-              <a:rPr lang="en-US" dirty="0" smtClean="0"/>
-              <a:t>Maine.</a:t>
-            </a:r>
-            <a:endParaRPr lang="en-US" baseline="30000" dirty="0"/>
-          </a:p>
-          <a:p>
-            <a:r>
-              <a:rPr lang="en-US" dirty="0" smtClean="0"/>
-              <a:t>She </a:t>
-            </a:r>
-            <a:r>
-              <a:rPr lang="en-US" dirty="0"/>
-              <a:t>lived from 1834 to 1931, where she traveled around Maine collecting samples and cataloging hundreds of the flora in </a:t>
-            </a:r>
-            <a:r>
-              <a:rPr lang="en-US" dirty="0" smtClean="0"/>
-              <a:t>Maine.</a:t>
-            </a:r>
-            <a:endParaRPr lang="en-US" baseline="30000" dirty="0"/>
-          </a:p>
-          <a:p>
-            <a:r>
-              <a:rPr lang="en-US" dirty="0" smtClean="0"/>
-              <a:t>Our </a:t>
-            </a:r>
-            <a:r>
-              <a:rPr lang="en-US" dirty="0"/>
-              <a:t>project uses a dataset that holds information on each sample in her catalogues, such as: </a:t>
-            </a:r>
-          </a:p>
-          <a:p>
-            <a:pPr lvl="1"/>
-            <a:r>
-              <a:rPr lang="en-US" dirty="0"/>
-              <a:t>Location of where the sample was found</a:t>
-            </a:r>
-          </a:p>
-          <a:p>
-            <a:pPr lvl="1"/>
-            <a:r>
-              <a:rPr lang="en-US" dirty="0"/>
-              <a:t>Year that the sample was found</a:t>
-            </a:r>
-          </a:p>
-          <a:p>
-            <a:pPr lvl="1"/>
-            <a:r>
-              <a:rPr lang="en-US" dirty="0"/>
-              <a:t>Common and scientific labels (current and at time of discovery)</a:t>
-            </a:r>
-          </a:p>
-          <a:p>
-            <a:pPr lvl="1"/>
-            <a:r>
-              <a:rPr lang="en-US" dirty="0"/>
-              <a:t>Where in her books each flora sample can be found</a:t>
-            </a:r>
-          </a:p>
-          <a:p>
-            <a:endParaRPr lang="en-US" dirty="0"/>
+              <a:rPr lang="en-US" sz="4000" dirty="0" smtClean="0"/>
+              <a:t>Our dataset</a:t>
+            </a:r>
+            <a:endParaRPr lang="en-US" sz="4000" dirty="0" smtClean="0"/>
+          </a:p>
+          <a:p>
+            <a:r>
+              <a:rPr lang="en-US" sz="4000" dirty="0" smtClean="0"/>
+              <a:t>Who was Kate Furbish?</a:t>
+            </a:r>
+            <a:endParaRPr lang="en-US" sz="4000" baseline="30000" dirty="0"/>
+          </a:p>
+          <a:p>
+            <a:r>
+              <a:rPr lang="en-US" sz="4000" dirty="0" smtClean="0"/>
+              <a:t>Information held in each sample</a:t>
+            </a:r>
           </a:p>
         </p:txBody>
       </p:sp>
@@ -8839,13 +10288,8 @@
             </a:pPr>
             <a:r>
               <a:rPr lang="en-US" dirty="0" smtClean="0"/>
-              <a:t>Determine which were her most active </a:t>
-            </a:r>
-            <a:r>
-              <a:rPr lang="en-US" dirty="0" smtClean="0"/>
-              <a:t>years</a:t>
-            </a:r>
-            <a:endParaRPr lang="en-US" dirty="0" smtClean="0"/>
+              <a:t>Determine which were her most active years</a:t>
+            </a:r>
           </a:p>
         </p:txBody>
       </p:sp>
@@ -8966,8 +10410,9 @@
             </a:pPr>
             <a:r>
               <a:rPr lang="en-US" dirty="0" smtClean="0"/>
-              <a:t>Zoom in on state to display distribution + further detail (future)</a:t>
-            </a:r>
+              <a:t>Future zoom capabilities</a:t>
+            </a:r>
+            <a:endParaRPr lang="en-US" dirty="0" smtClean="0"/>
           </a:p>
           <a:p>
             <a:pPr>
@@ -9031,7 +10476,11 @@
             </a:pPr>
             <a:r>
               <a:rPr lang="en-US" dirty="0" smtClean="0"/>
-              <a:t>Enables clicking to see specific flora (select individually &amp; select all)</a:t>
+              <a:t>Enables clicking to see specific flora </a:t>
+            </a:r>
+            <a:r>
+              <a:rPr lang="en-US" dirty="0" smtClean="0"/>
+              <a:t>on map</a:t>
             </a:r>
           </a:p>
           <a:p>
@@ -9042,8 +10491,17 @@
             </a:pPr>
             <a:r>
               <a:rPr lang="en-US" dirty="0" smtClean="0"/>
-              <a:t>Enables deselect to remove specific flora (deselect individually &amp; deselect all)</a:t>
-            </a:r>
+              <a:t>Enables </a:t>
+            </a:r>
+            <a:r>
+              <a:rPr lang="en-US" dirty="0" smtClean="0"/>
+              <a:t>deselect to remove specific </a:t>
+            </a:r>
+            <a:r>
+              <a:rPr lang="en-US" dirty="0" smtClean="0"/>
+              <a:t>flora from map</a:t>
+            </a:r>
+            <a:endParaRPr lang="en-US" dirty="0" smtClean="0"/>
           </a:p>
         </p:txBody>
       </p:sp>
@@ -9353,7 +10811,7 @@
         <p:spPr/>
         <p:txBody>
           <a:bodyPr>
-            <a:normAutofit/>
+            <a:normAutofit fontScale="85000" lnSpcReduction="10000"/>
           </a:bodyPr>
           <a:lstStyle/>
           <a:p>
@@ -9398,11 +10856,7 @@
             </a:pPr>
             <a:r>
               <a:rPr lang="en-US" dirty="0" smtClean="0"/>
-              <a:t>Information </a:t>
-            </a:r>
-            <a:r>
-              <a:rPr lang="en-US" dirty="0" smtClean="0"/>
-              <a:t>passing</a:t>
+              <a:t>Information passing</a:t>
             </a:r>
           </a:p>
           <a:p>
@@ -9412,10 +10866,9 @@
               </a:lnSpc>
             </a:pPr>
             <a:r>
-              <a:rPr lang="en-US" smtClean="0"/>
+              <a:rPr lang="en-US" dirty="0" smtClean="0"/>
               <a:t>Animate to show time-lapse</a:t>
             </a:r>
-            <a:endParaRPr lang="en-US" dirty="0" smtClean="0"/>
           </a:p>
           <a:p>
             <a:pPr>
@@ -9444,7 +10897,31 @@
             </a:pPr>
             <a:r>
               <a:rPr lang="en-US" dirty="0" smtClean="0"/>
-              <a:t>When zoomed in (due to click), show donut chart displaying distribution</a:t>
+              <a:t>When zoomed </a:t>
+            </a:r>
+            <a:r>
+              <a:rPr lang="en-US" dirty="0" smtClean="0"/>
+              <a:t>in, show </a:t>
+            </a:r>
+            <a:r>
+              <a:rPr lang="en-US" dirty="0" smtClean="0"/>
+              <a:t>donut chart displaying </a:t>
+            </a:r>
+            <a:r>
+              <a:rPr lang="en-US" dirty="0" smtClean="0"/>
+              <a:t>distribution</a:t>
+            </a:r>
+            <a:endParaRPr lang="en-US" dirty="0"/>
+          </a:p>
+          <a:p>
+            <a:pPr>
+              <a:lnSpc>
+                <a:spcPct val="200000"/>
+              </a:lnSpc>
+            </a:pPr>
+            <a:r>
+              <a:rPr lang="en-US" dirty="0" smtClean="0"/>
+              <a:t>Debugging</a:t>
             </a:r>
             <a:endParaRPr lang="en-US" dirty="0"/>
           </a:p>
@@ -9527,7 +11004,7 @@
           <p:nvPr/>
         </p:nvPicPr>
         <p:blipFill>
-          <a:blip r:embed="rId2">
+          <a:blip r:embed="rId3">
             <a:extLst>
               <a:ext uri="{28A0092B-C50C-407E-A947-70E740481C1C}">
                 <a14:useLocalDpi xmlns:a14="http://schemas.microsoft.com/office/drawing/2010/main" val="0"/>

</xml_diff>